<commit_message>
prefab added pet get추가
내 물건들 프리팹화
현재 pet get할 수 있는 메소드 PetStatManager에추가
</commit_message>
<xml_diff>
--- a/Docs/touchManager.pptx
+++ b/Docs/touchManager.pptx
@@ -260,7 +260,7 @@
           <a:p>
             <a:fld id="{45318702-0BCB-4EEC-A911-74F98319DB66}" type="datetimeFigureOut">
               <a:rPr lang="ko-KR" altLang="en-US" smtClean="0"/>
-              <a:t>2023-12-02</a:t>
+              <a:t>2023-12-04</a:t>
             </a:fld>
             <a:endParaRPr lang="ko-KR" altLang="en-US"/>
           </a:p>
@@ -458,7 +458,7 @@
           <a:p>
             <a:fld id="{45318702-0BCB-4EEC-A911-74F98319DB66}" type="datetimeFigureOut">
               <a:rPr lang="ko-KR" altLang="en-US" smtClean="0"/>
-              <a:t>2023-12-02</a:t>
+              <a:t>2023-12-04</a:t>
             </a:fld>
             <a:endParaRPr lang="ko-KR" altLang="en-US"/>
           </a:p>
@@ -666,7 +666,7 @@
           <a:p>
             <a:fld id="{45318702-0BCB-4EEC-A911-74F98319DB66}" type="datetimeFigureOut">
               <a:rPr lang="ko-KR" altLang="en-US" smtClean="0"/>
-              <a:t>2023-12-02</a:t>
+              <a:t>2023-12-04</a:t>
             </a:fld>
             <a:endParaRPr lang="ko-KR" altLang="en-US"/>
           </a:p>
@@ -864,7 +864,7 @@
           <a:p>
             <a:fld id="{45318702-0BCB-4EEC-A911-74F98319DB66}" type="datetimeFigureOut">
               <a:rPr lang="ko-KR" altLang="en-US" smtClean="0"/>
-              <a:t>2023-12-02</a:t>
+              <a:t>2023-12-04</a:t>
             </a:fld>
             <a:endParaRPr lang="ko-KR" altLang="en-US"/>
           </a:p>
@@ -1139,7 +1139,7 @@
           <a:p>
             <a:fld id="{45318702-0BCB-4EEC-A911-74F98319DB66}" type="datetimeFigureOut">
               <a:rPr lang="ko-KR" altLang="en-US" smtClean="0"/>
-              <a:t>2023-12-02</a:t>
+              <a:t>2023-12-04</a:t>
             </a:fld>
             <a:endParaRPr lang="ko-KR" altLang="en-US"/>
           </a:p>
@@ -1404,7 +1404,7 @@
           <a:p>
             <a:fld id="{45318702-0BCB-4EEC-A911-74F98319DB66}" type="datetimeFigureOut">
               <a:rPr lang="ko-KR" altLang="en-US" smtClean="0"/>
-              <a:t>2023-12-02</a:t>
+              <a:t>2023-12-04</a:t>
             </a:fld>
             <a:endParaRPr lang="ko-KR" altLang="en-US"/>
           </a:p>
@@ -1816,7 +1816,7 @@
           <a:p>
             <a:fld id="{45318702-0BCB-4EEC-A911-74F98319DB66}" type="datetimeFigureOut">
               <a:rPr lang="ko-KR" altLang="en-US" smtClean="0"/>
-              <a:t>2023-12-02</a:t>
+              <a:t>2023-12-04</a:t>
             </a:fld>
             <a:endParaRPr lang="ko-KR" altLang="en-US"/>
           </a:p>
@@ -1957,7 +1957,7 @@
           <a:p>
             <a:fld id="{45318702-0BCB-4EEC-A911-74F98319DB66}" type="datetimeFigureOut">
               <a:rPr lang="ko-KR" altLang="en-US" smtClean="0"/>
-              <a:t>2023-12-02</a:t>
+              <a:t>2023-12-04</a:t>
             </a:fld>
             <a:endParaRPr lang="ko-KR" altLang="en-US"/>
           </a:p>
@@ -2070,7 +2070,7 @@
           <a:p>
             <a:fld id="{45318702-0BCB-4EEC-A911-74F98319DB66}" type="datetimeFigureOut">
               <a:rPr lang="ko-KR" altLang="en-US" smtClean="0"/>
-              <a:t>2023-12-02</a:t>
+              <a:t>2023-12-04</a:t>
             </a:fld>
             <a:endParaRPr lang="ko-KR" altLang="en-US"/>
           </a:p>
@@ -2381,7 +2381,7 @@
           <a:p>
             <a:fld id="{45318702-0BCB-4EEC-A911-74F98319DB66}" type="datetimeFigureOut">
               <a:rPr lang="ko-KR" altLang="en-US" smtClean="0"/>
-              <a:t>2023-12-02</a:t>
+              <a:t>2023-12-04</a:t>
             </a:fld>
             <a:endParaRPr lang="ko-KR" altLang="en-US"/>
           </a:p>
@@ -2669,7 +2669,7 @@
           <a:p>
             <a:fld id="{45318702-0BCB-4EEC-A911-74F98319DB66}" type="datetimeFigureOut">
               <a:rPr lang="ko-KR" altLang="en-US" smtClean="0"/>
-              <a:t>2023-12-02</a:t>
+              <a:t>2023-12-04</a:t>
             </a:fld>
             <a:endParaRPr lang="ko-KR" altLang="en-US"/>
           </a:p>
@@ -2910,7 +2910,7 @@
           <a:p>
             <a:fld id="{45318702-0BCB-4EEC-A911-74F98319DB66}" type="datetimeFigureOut">
               <a:rPr lang="ko-KR" altLang="en-US" smtClean="0"/>
-              <a:t>2023-12-02</a:t>
+              <a:t>2023-12-04</a:t>
             </a:fld>
             <a:endParaRPr lang="ko-KR" altLang="en-US"/>
           </a:p>
@@ -3607,7 +3607,7 @@
         <p:spPr>
           <a:xfrm>
             <a:off x="855677" y="461394"/>
-            <a:ext cx="9085277" cy="2031325"/>
+            <a:ext cx="9085277" cy="2862322"/>
           </a:xfrm>
           <a:prstGeom prst="rect">
             <a:avLst/>
@@ -3728,8 +3728,32 @@
               <a:t>변수를 선언하시면 될 것 같습니다</a:t>
             </a:r>
             <a:r>
-              <a:rPr lang="en-US" altLang="ko-KR"/>
+              <a:rPr lang="en-US" altLang="ko-KR" dirty="0"/>
               <a:t>.</a:t>
+            </a:r>
+          </a:p>
+          <a:p>
+            <a:endParaRPr lang="en-US" altLang="ko-KR" dirty="0"/>
+          </a:p>
+          <a:p>
+            <a:r>
+              <a:rPr lang="ko-KR" altLang="en-US" dirty="0"/>
+              <a:t>현재 펫 접근법</a:t>
+            </a:r>
+            <a:endParaRPr lang="en-US" altLang="ko-KR" dirty="0"/>
+          </a:p>
+          <a:p>
+            <a:r>
+              <a:rPr lang="en-US" altLang="ko-KR" dirty="0"/>
+              <a:t> </a:t>
+            </a:r>
+            <a:r>
+              <a:rPr lang="en-US" altLang="ko-KR" dirty="0" err="1"/>
+              <a:t>PetStatManager.Instance.GetCurrentPet</a:t>
+            </a:r>
+            <a:r>
+              <a:rPr lang="en-US" altLang="ko-KR" dirty="0"/>
+              <a:t>();</a:t>
             </a:r>
           </a:p>
         </p:txBody>

</xml_diff>